<commit_message>
adding sessions 4 & 5, updating session 6
</commit_message>
<xml_diff>
--- a/COM_MScBioinformatics_2020_Session6.pptx
+++ b/COM_MScBioinformatics_2020_Session6.pptx
@@ -10808,7 +10808,7 @@
                 </a:pPr>
                 <a:r>
                   <a:rPr/>
-                  <a:t>[end of Session 5]</a:t>
+                  <a:t>[end of Session 6]</a:t>
                 </a:r>
               </a:p>
             </p:txBody>
@@ -13529,7 +13529,7 @@
                 </a:solidFill>
                 <a:latin typeface="Courier"/>
               </a:rPr>
-              <a:t>## [1] 813.8608</a:t>
+              <a:t>## [1] 577.8911</a:t>
             </a:r>
             <a:br/>
             <a:r>
@@ -13600,7 +13600,7 @@
                 </a:solidFill>
                 <a:latin typeface="Courier"/>
               </a:rPr>
-              <a:t>## [1] 409.0341</a:t>
+              <a:t>## [1] 262.3172</a:t>
             </a:r>
             <a:br/>
             <a:r>
@@ -13671,7 +13671,7 @@
                 </a:solidFill>
                 <a:latin typeface="Courier"/>
               </a:rPr>
-              <a:t>## [1] 188.4107</a:t>
+              <a:t>## [1] 118.1222</a:t>
             </a:r>
             <a:br/>
             <a:r>
@@ -13742,7 +13742,7 @@
                 </a:solidFill>
                 <a:latin typeface="Courier"/>
               </a:rPr>
-              <a:t>## [1] 83.3517</a:t>
+              <a:t>## [1] 80.71504</a:t>
             </a:r>
           </a:p>
         </p:txBody>
@@ -14078,7 +14078,7 @@
                     </a:solidFill>
                     <a:latin typeface="Courier"/>
                   </a:rPr>
-                  <a:t>## [1] 3.353977 1.607235</a:t>
+                  <a:t>## [1] 2.551332 1.458639</a:t>
                 </a:r>
                 <a:br/>
                 <a:r>
@@ -14119,7 +14119,7 @@
                     </a:solidFill>
                     <a:latin typeface="Courier"/>
                   </a:rPr>
-                  <a:t>## [1] 78.36097</a:t>
+                  <a:t>## [1] 75.59071</a:t>
                 </a:r>
               </a:p>
               <a:p>
@@ -14825,7 +14825,7 @@
                     </a:solidFill>
                     <a:latin typeface="Courier"/>
                   </a:rPr>
-                  <a:t>##       3.354        1.607</a:t>
+                  <a:t>##       2.551        1.459</a:t>
                 </a:r>
               </a:p>
             </p:txBody>
@@ -21160,7 +21160,7 @@
                 </a:solidFill>
                 <a:latin typeface="Courier"/>
               </a:rPr>
-              <a:t>## -3.3857  -1.1493  -0.0332   1.3336   3.5797  </a:t>
+              <a:t>## -3.7906  -0.7144   0.0007   1.2046   3.4238  </a:t>
             </a:r>
             <a:br/>
             <a:r>
@@ -21200,7 +21200,7 @@
                 </a:solidFill>
                 <a:latin typeface="Courier"/>
               </a:rPr>
-              <a:t>## (Intercept)   3.3543     0.3705   9.053 4.83e-09 ***</a:t>
+              <a:t>## (Intercept)   2.5512     0.3640   7.009 3.84e-07 ***</a:t>
             </a:r>
             <a:br/>
             <a:r>
@@ -21210,7 +21210,7 @@
                 </a:solidFill>
                 <a:latin typeface="Courier"/>
               </a:rPr>
-              <a:t>## x             1.6073     0.1306  12.308 1.33e-11 ***</a:t>
+              <a:t>## x             1.4586     0.1355  10.765 1.87e-10 ***</a:t>
             </a:r>
             <a:br/>
             <a:r>
@@ -21250,7 +21250,7 @@
                 </a:solidFill>
                 <a:latin typeface="Courier"/>
               </a:rPr>
-              <a:t>## (Dispersion parameter for gaussian family taken to be 3.406999)</a:t>
+              <a:t>## (Dispersion parameter for gaussian family taken to be 3.286552)</a:t>
             </a:r>
             <a:br/>
             <a:r>
@@ -21270,7 +21270,7 @@
                 </a:solidFill>
                 <a:latin typeface="Courier"/>
               </a:rPr>
-              <a:t>##     Null deviance: 594.465  on 24  degrees of freedom</a:t>
+              <a:t>##     Null deviance: 456.478  on 24  degrees of freedom</a:t>
             </a:r>
             <a:br/>
             <a:r>
@@ -21280,7 +21280,7 @@
                 </a:solidFill>
                 <a:latin typeface="Courier"/>
               </a:rPr>
-              <a:t>## Residual deviance:  78.361  on 23  degrees of freedom</a:t>
+              <a:t>## Residual deviance:  75.591  on 23  degrees of freedom</a:t>
             </a:r>
             <a:br/>
             <a:r>
@@ -21290,7 +21290,7 @@
                 </a:solidFill>
                 <a:latin typeface="Courier"/>
               </a:rPr>
-              <a:t>## AIC: 105.51</a:t>
+              <a:t>## AIC: 104.61</a:t>
             </a:r>
             <a:br/>
             <a:r>

</xml_diff>